<commit_message>
final project ppt is changed
Signed-off-by: mrinmoy sarkar <mrinmoy.pol@gmail.com>
</commit_message>
<xml_diff>
--- a/final-project/final-project.pptx
+++ b/final-project/final-project.pptx
@@ -4,6 +4,9 @@
   <p:sldMasterIdLst>
     <p:sldMasterId id="2147483660" r:id="rId1"/>
   </p:sldMasterIdLst>
+  <p:notesMasterIdLst>
+    <p:notesMasterId r:id="rId17"/>
+  </p:notesMasterIdLst>
   <p:sldIdLst>
     <p:sldId id="256" r:id="rId2"/>
     <p:sldId id="262" r:id="rId3"/>
@@ -118,7 +121,361 @@
       </a:defRPr>
     </a:lvl9pPr>
   </p:defaultTextStyle>
+  <p:extLst>
+    <p:ext uri="{EFAFB233-063F-42B5-8137-9DF3F51BA10A}">
+      <p15:sldGuideLst xmlns:p15="http://schemas.microsoft.com/office/powerpoint/2012/main"/>
+    </p:ext>
+  </p:extLst>
 </p:presentation>
+</file>
+
+<file path=ppt/notesMasters/notesMaster1.xml><?xml version="1.0" encoding="utf-8"?>
+<p:notesMaster xmlns:a="http://schemas.openxmlformats.org/drawingml/2006/main" xmlns:r="http://schemas.openxmlformats.org/officeDocument/2006/relationships" xmlns:p="http://schemas.openxmlformats.org/presentationml/2006/main">
+  <p:cSld>
+    <p:bg>
+      <p:bgRef idx="1001">
+        <a:schemeClr val="bg1"/>
+      </p:bgRef>
+    </p:bg>
+    <p:spTree>
+      <p:nvGrpSpPr>
+        <p:cNvPr id="1" name=""/>
+        <p:cNvGrpSpPr/>
+        <p:nvPr/>
+      </p:nvGrpSpPr>
+      <p:grpSpPr>
+        <a:xfrm>
+          <a:off x="0" y="0"/>
+          <a:ext cx="0" cy="0"/>
+          <a:chOff x="0" y="0"/>
+          <a:chExt cx="0" cy="0"/>
+        </a:xfrm>
+      </p:grpSpPr>
+      <p:sp>
+        <p:nvSpPr>
+          <p:cNvPr id="2" name="Header Placeholder 1"/>
+          <p:cNvSpPr>
+            <a:spLocks noGrp="1"/>
+          </p:cNvSpPr>
+          <p:nvPr>
+            <p:ph type="hdr" sz="quarter"/>
+          </p:nvPr>
+        </p:nvSpPr>
+        <p:spPr>
+          <a:xfrm>
+            <a:off x="0" y="0"/>
+            <a:ext cx="2971800" cy="458788"/>
+          </a:xfrm>
+          <a:prstGeom prst="rect">
+            <a:avLst/>
+          </a:prstGeom>
+        </p:spPr>
+        <p:txBody>
+          <a:bodyPr vert="horz" lIns="91440" tIns="45720" rIns="91440" bIns="45720" rtlCol="0"/>
+          <a:lstStyle>
+            <a:lvl1pPr algn="l">
+              <a:defRPr sz="1200"/>
+            </a:lvl1pPr>
+          </a:lstStyle>
+          <a:p>
+            <a:endParaRPr lang="en-US"/>
+          </a:p>
+        </p:txBody>
+      </p:sp>
+      <p:sp>
+        <p:nvSpPr>
+          <p:cNvPr id="3" name="Date Placeholder 2"/>
+          <p:cNvSpPr>
+            <a:spLocks noGrp="1"/>
+          </p:cNvSpPr>
+          <p:nvPr>
+            <p:ph type="dt" idx="1"/>
+          </p:nvPr>
+        </p:nvSpPr>
+        <p:spPr>
+          <a:xfrm>
+            <a:off x="3884613" y="0"/>
+            <a:ext cx="2971800" cy="458788"/>
+          </a:xfrm>
+          <a:prstGeom prst="rect">
+            <a:avLst/>
+          </a:prstGeom>
+        </p:spPr>
+        <p:txBody>
+          <a:bodyPr vert="horz" lIns="91440" tIns="45720" rIns="91440" bIns="45720" rtlCol="0"/>
+          <a:lstStyle>
+            <a:lvl1pPr algn="r">
+              <a:defRPr sz="1200"/>
+            </a:lvl1pPr>
+          </a:lstStyle>
+          <a:p>
+            <a:fld id="{924C4F3D-22EF-4258-9F21-32434FEE1E51}" type="datetimeFigureOut">
+              <a:rPr lang="en-US" smtClean="0"/>
+              <a:t>4/25/2018</a:t>
+            </a:fld>
+            <a:endParaRPr lang="en-US"/>
+          </a:p>
+        </p:txBody>
+      </p:sp>
+      <p:sp>
+        <p:nvSpPr>
+          <p:cNvPr id="4" name="Slide Image Placeholder 3"/>
+          <p:cNvSpPr>
+            <a:spLocks noGrp="1" noRot="1" noChangeAspect="1"/>
+          </p:cNvSpPr>
+          <p:nvPr>
+            <p:ph type="sldImg" idx="2"/>
+          </p:nvPr>
+        </p:nvSpPr>
+        <p:spPr>
+          <a:xfrm>
+            <a:off x="685800" y="1143000"/>
+            <a:ext cx="5486400" cy="3086100"/>
+          </a:xfrm>
+          <a:prstGeom prst="rect">
+            <a:avLst/>
+          </a:prstGeom>
+          <a:noFill/>
+          <a:ln w="12700">
+            <a:solidFill>
+              <a:prstClr val="black"/>
+            </a:solidFill>
+          </a:ln>
+        </p:spPr>
+        <p:txBody>
+          <a:bodyPr vert="horz" lIns="91440" tIns="45720" rIns="91440" bIns="45720" rtlCol="0" anchor="ctr"/>
+          <a:lstStyle/>
+          <a:p>
+            <a:endParaRPr lang="en-US"/>
+          </a:p>
+        </p:txBody>
+      </p:sp>
+      <p:sp>
+        <p:nvSpPr>
+          <p:cNvPr id="5" name="Notes Placeholder 4"/>
+          <p:cNvSpPr>
+            <a:spLocks noGrp="1"/>
+          </p:cNvSpPr>
+          <p:nvPr>
+            <p:ph type="body" sz="quarter" idx="3"/>
+          </p:nvPr>
+        </p:nvSpPr>
+        <p:spPr>
+          <a:xfrm>
+            <a:off x="685800" y="4400550"/>
+            <a:ext cx="5486400" cy="3600450"/>
+          </a:xfrm>
+          <a:prstGeom prst="rect">
+            <a:avLst/>
+          </a:prstGeom>
+        </p:spPr>
+        <p:txBody>
+          <a:bodyPr vert="horz" lIns="91440" tIns="45720" rIns="91440" bIns="45720" rtlCol="0"/>
+          <a:lstStyle/>
+          <a:p>
+            <a:pPr lvl="0"/>
+            <a:r>
+              <a:rPr lang="en-US"/>
+              <a:t>Edit Master text styles</a:t>
+            </a:r>
+          </a:p>
+          <a:p>
+            <a:pPr lvl="1"/>
+            <a:r>
+              <a:rPr lang="en-US"/>
+              <a:t>Second level</a:t>
+            </a:r>
+          </a:p>
+          <a:p>
+            <a:pPr lvl="2"/>
+            <a:r>
+              <a:rPr lang="en-US"/>
+              <a:t>Third level</a:t>
+            </a:r>
+          </a:p>
+          <a:p>
+            <a:pPr lvl="3"/>
+            <a:r>
+              <a:rPr lang="en-US"/>
+              <a:t>Fourth level</a:t>
+            </a:r>
+          </a:p>
+          <a:p>
+            <a:pPr lvl="4"/>
+            <a:r>
+              <a:rPr lang="en-US"/>
+              <a:t>Fifth level</a:t>
+            </a:r>
+          </a:p>
+        </p:txBody>
+      </p:sp>
+      <p:sp>
+        <p:nvSpPr>
+          <p:cNvPr id="6" name="Footer Placeholder 5"/>
+          <p:cNvSpPr>
+            <a:spLocks noGrp="1"/>
+          </p:cNvSpPr>
+          <p:nvPr>
+            <p:ph type="ftr" sz="quarter" idx="4"/>
+          </p:nvPr>
+        </p:nvSpPr>
+        <p:spPr>
+          <a:xfrm>
+            <a:off x="0" y="8685213"/>
+            <a:ext cx="2971800" cy="458787"/>
+          </a:xfrm>
+          <a:prstGeom prst="rect">
+            <a:avLst/>
+          </a:prstGeom>
+        </p:spPr>
+        <p:txBody>
+          <a:bodyPr vert="horz" lIns="91440" tIns="45720" rIns="91440" bIns="45720" rtlCol="0" anchor="b"/>
+          <a:lstStyle>
+            <a:lvl1pPr algn="l">
+              <a:defRPr sz="1200"/>
+            </a:lvl1pPr>
+          </a:lstStyle>
+          <a:p>
+            <a:endParaRPr lang="en-US"/>
+          </a:p>
+        </p:txBody>
+      </p:sp>
+      <p:sp>
+        <p:nvSpPr>
+          <p:cNvPr id="7" name="Slide Number Placeholder 6"/>
+          <p:cNvSpPr>
+            <a:spLocks noGrp="1"/>
+          </p:cNvSpPr>
+          <p:nvPr>
+            <p:ph type="sldNum" sz="quarter" idx="5"/>
+          </p:nvPr>
+        </p:nvSpPr>
+        <p:spPr>
+          <a:xfrm>
+            <a:off x="3884613" y="8685213"/>
+            <a:ext cx="2971800" cy="458787"/>
+          </a:xfrm>
+          <a:prstGeom prst="rect">
+            <a:avLst/>
+          </a:prstGeom>
+        </p:spPr>
+        <p:txBody>
+          <a:bodyPr vert="horz" lIns="91440" tIns="45720" rIns="91440" bIns="45720" rtlCol="0" anchor="b"/>
+          <a:lstStyle>
+            <a:lvl1pPr algn="r">
+              <a:defRPr sz="1200"/>
+            </a:lvl1pPr>
+          </a:lstStyle>
+          <a:p>
+            <a:fld id="{B7B85954-9581-4994-8339-86B683F88494}" type="slidenum">
+              <a:rPr lang="en-US" smtClean="0"/>
+              <a:t>‹#›</a:t>
+            </a:fld>
+            <a:endParaRPr lang="en-US"/>
+          </a:p>
+        </p:txBody>
+      </p:sp>
+    </p:spTree>
+    <p:extLst>
+      <p:ext uri="{BB962C8B-B14F-4D97-AF65-F5344CB8AC3E}">
+        <p14:creationId xmlns:p14="http://schemas.microsoft.com/office/powerpoint/2010/main" val="3420443115"/>
+      </p:ext>
+    </p:extLst>
+  </p:cSld>
+  <p:clrMap bg1="lt1" tx1="dk1" bg2="lt2" tx2="dk2" accent1="accent1" accent2="accent2" accent3="accent3" accent4="accent4" accent5="accent5" accent6="accent6" hlink="hlink" folHlink="folHlink"/>
+  <p:notesStyle>
+    <a:lvl1pPr marL="0" algn="l" defTabSz="914400" rtl="0" eaLnBrk="1" latinLnBrk="0" hangingPunct="1">
+      <a:defRPr sz="1200" kern="1200">
+        <a:solidFill>
+          <a:schemeClr val="tx1"/>
+        </a:solidFill>
+        <a:latin typeface="+mn-lt"/>
+        <a:ea typeface="+mn-ea"/>
+        <a:cs typeface="+mn-cs"/>
+      </a:defRPr>
+    </a:lvl1pPr>
+    <a:lvl2pPr marL="457200" algn="l" defTabSz="914400" rtl="0" eaLnBrk="1" latinLnBrk="0" hangingPunct="1">
+      <a:defRPr sz="1200" kern="1200">
+        <a:solidFill>
+          <a:schemeClr val="tx1"/>
+        </a:solidFill>
+        <a:latin typeface="+mn-lt"/>
+        <a:ea typeface="+mn-ea"/>
+        <a:cs typeface="+mn-cs"/>
+      </a:defRPr>
+    </a:lvl2pPr>
+    <a:lvl3pPr marL="914400" algn="l" defTabSz="914400" rtl="0" eaLnBrk="1" latinLnBrk="0" hangingPunct="1">
+      <a:defRPr sz="1200" kern="1200">
+        <a:solidFill>
+          <a:schemeClr val="tx1"/>
+        </a:solidFill>
+        <a:latin typeface="+mn-lt"/>
+        <a:ea typeface="+mn-ea"/>
+        <a:cs typeface="+mn-cs"/>
+      </a:defRPr>
+    </a:lvl3pPr>
+    <a:lvl4pPr marL="1371600" algn="l" defTabSz="914400" rtl="0" eaLnBrk="1" latinLnBrk="0" hangingPunct="1">
+      <a:defRPr sz="1200" kern="1200">
+        <a:solidFill>
+          <a:schemeClr val="tx1"/>
+        </a:solidFill>
+        <a:latin typeface="+mn-lt"/>
+        <a:ea typeface="+mn-ea"/>
+        <a:cs typeface="+mn-cs"/>
+      </a:defRPr>
+    </a:lvl4pPr>
+    <a:lvl5pPr marL="1828800" algn="l" defTabSz="914400" rtl="0" eaLnBrk="1" latinLnBrk="0" hangingPunct="1">
+      <a:defRPr sz="1200" kern="1200">
+        <a:solidFill>
+          <a:schemeClr val="tx1"/>
+        </a:solidFill>
+        <a:latin typeface="+mn-lt"/>
+        <a:ea typeface="+mn-ea"/>
+        <a:cs typeface="+mn-cs"/>
+      </a:defRPr>
+    </a:lvl5pPr>
+    <a:lvl6pPr marL="2286000" algn="l" defTabSz="914400" rtl="0" eaLnBrk="1" latinLnBrk="0" hangingPunct="1">
+      <a:defRPr sz="1200" kern="1200">
+        <a:solidFill>
+          <a:schemeClr val="tx1"/>
+        </a:solidFill>
+        <a:latin typeface="+mn-lt"/>
+        <a:ea typeface="+mn-ea"/>
+        <a:cs typeface="+mn-cs"/>
+      </a:defRPr>
+    </a:lvl6pPr>
+    <a:lvl7pPr marL="2743200" algn="l" defTabSz="914400" rtl="0" eaLnBrk="1" latinLnBrk="0" hangingPunct="1">
+      <a:defRPr sz="1200" kern="1200">
+        <a:solidFill>
+          <a:schemeClr val="tx1"/>
+        </a:solidFill>
+        <a:latin typeface="+mn-lt"/>
+        <a:ea typeface="+mn-ea"/>
+        <a:cs typeface="+mn-cs"/>
+      </a:defRPr>
+    </a:lvl7pPr>
+    <a:lvl8pPr marL="3200400" algn="l" defTabSz="914400" rtl="0" eaLnBrk="1" latinLnBrk="0" hangingPunct="1">
+      <a:defRPr sz="1200" kern="1200">
+        <a:solidFill>
+          <a:schemeClr val="tx1"/>
+        </a:solidFill>
+        <a:latin typeface="+mn-lt"/>
+        <a:ea typeface="+mn-ea"/>
+        <a:cs typeface="+mn-cs"/>
+      </a:defRPr>
+    </a:lvl8pPr>
+    <a:lvl9pPr marL="3657600" algn="l" defTabSz="914400" rtl="0" eaLnBrk="1" latinLnBrk="0" hangingPunct="1">
+      <a:defRPr sz="1200" kern="1200">
+        <a:solidFill>
+          <a:schemeClr val="tx1"/>
+        </a:solidFill>
+        <a:latin typeface="+mn-lt"/>
+        <a:ea typeface="+mn-ea"/>
+        <a:cs typeface="+mn-cs"/>
+      </a:defRPr>
+    </a:lvl9pPr>
+  </p:notesStyle>
+</p:notesMaster>
 </file>
 
 <file path=ppt/slideLayouts/slideLayout1.xml><?xml version="1.0" encoding="utf-8"?>
@@ -8912,9 +9269,9 @@
             </a:lvl1pPr>
           </a:lstStyle>
           <a:p>
-            <a:fld id="{294EEB5F-85E1-4A55-9338-2F60FBD16A33}" type="datetimeFigureOut">
+            <a:fld id="{14DD47BD-98BF-4D76-BF4E-C664B33B35D3}" type="datetime1">
               <a:rPr lang="en-US" smtClean="0"/>
-              <a:t>4/24/2018</a:t>
+              <a:t>4/25/2018</a:t>
             </a:fld>
             <a:endParaRPr lang="en-US"/>
           </a:p>
@@ -9119,9 +9476,9 @@
           <a:bodyPr/>
           <a:lstStyle/>
           <a:p>
-            <a:fld id="{294EEB5F-85E1-4A55-9338-2F60FBD16A33}" type="datetimeFigureOut">
+            <a:fld id="{764665CD-1988-413D-99FF-0E01C77D659E}" type="datetime1">
               <a:rPr lang="en-US" smtClean="0"/>
-              <a:t>4/24/2018</a:t>
+              <a:t>4/25/2018</a:t>
             </a:fld>
             <a:endParaRPr lang="en-US"/>
           </a:p>
@@ -9299,9 +9656,9 @@
           <a:bodyPr/>
           <a:lstStyle/>
           <a:p>
-            <a:fld id="{294EEB5F-85E1-4A55-9338-2F60FBD16A33}" type="datetimeFigureOut">
+            <a:fld id="{793730A6-22EA-4DF5-ABDB-F9DD969D468C}" type="datetime1">
               <a:rPr lang="en-US" smtClean="0"/>
-              <a:t>4/24/2018</a:t>
+              <a:t>4/25/2018</a:t>
             </a:fld>
             <a:endParaRPr lang="en-US"/>
           </a:p>
@@ -9504,9 +9861,9 @@
           <a:bodyPr/>
           <a:lstStyle/>
           <a:p>
-            <a:fld id="{294EEB5F-85E1-4A55-9338-2F60FBD16A33}" type="datetimeFigureOut">
+            <a:fld id="{23B51F9A-B41F-417E-B3BE-AA4C3FD3FB08}" type="datetime1">
               <a:rPr lang="en-US" smtClean="0"/>
-              <a:t>4/24/2018</a:t>
+              <a:t>4/25/2018</a:t>
             </a:fld>
             <a:endParaRPr lang="en-US"/>
           </a:p>
@@ -18402,9 +18759,9 @@
           <a:bodyPr/>
           <a:lstStyle/>
           <a:p>
-            <a:fld id="{294EEB5F-85E1-4A55-9338-2F60FBD16A33}" type="datetimeFigureOut">
+            <a:fld id="{624EE414-7435-440E-B3B4-4D40FB50315D}" type="datetime1">
               <a:rPr lang="en-US" smtClean="0"/>
-              <a:t>4/24/2018</a:t>
+              <a:t>4/25/2018</a:t>
             </a:fld>
             <a:endParaRPr lang="en-US"/>
           </a:p>
@@ -18676,9 +19033,9 @@
           <a:bodyPr/>
           <a:lstStyle/>
           <a:p>
-            <a:fld id="{294EEB5F-85E1-4A55-9338-2F60FBD16A33}" type="datetimeFigureOut">
+            <a:fld id="{0F89A447-7B51-49DE-9814-0DE70B3F7661}" type="datetime1">
               <a:rPr lang="en-US" smtClean="0"/>
-              <a:t>4/24/2018</a:t>
+              <a:t>4/25/2018</a:t>
             </a:fld>
             <a:endParaRPr lang="en-US"/>
           </a:p>
@@ -19074,9 +19431,9 @@
           <a:bodyPr/>
           <a:lstStyle/>
           <a:p>
-            <a:fld id="{294EEB5F-85E1-4A55-9338-2F60FBD16A33}" type="datetimeFigureOut">
+            <a:fld id="{CA3C3F3A-F80E-4E88-8F21-C258F40E821C}" type="datetime1">
               <a:rPr lang="en-US" smtClean="0"/>
-              <a:t>4/24/2018</a:t>
+              <a:t>4/25/2018</a:t>
             </a:fld>
             <a:endParaRPr lang="en-US"/>
           </a:p>
@@ -19192,9 +19549,9 @@
           <a:bodyPr/>
           <a:lstStyle/>
           <a:p>
-            <a:fld id="{294EEB5F-85E1-4A55-9338-2F60FBD16A33}" type="datetimeFigureOut">
+            <a:fld id="{65F99AA5-1573-4533-AEBB-2955A699BA04}" type="datetime1">
               <a:rPr lang="en-US" smtClean="0"/>
-              <a:t>4/24/2018</a:t>
+              <a:t>4/25/2018</a:t>
             </a:fld>
             <a:endParaRPr lang="en-US"/>
           </a:p>
@@ -19287,9 +19644,9 @@
           <a:bodyPr/>
           <a:lstStyle/>
           <a:p>
-            <a:fld id="{294EEB5F-85E1-4A55-9338-2F60FBD16A33}" type="datetimeFigureOut">
+            <a:fld id="{1805C797-A0DC-4F91-8086-275EB8F75760}" type="datetime1">
               <a:rPr lang="en-US" smtClean="0"/>
-              <a:t>4/24/2018</a:t>
+              <a:t>4/25/2018</a:t>
             </a:fld>
             <a:endParaRPr lang="en-US"/>
           </a:p>
@@ -19577,9 +19934,9 @@
           <a:bodyPr/>
           <a:lstStyle/>
           <a:p>
-            <a:fld id="{294EEB5F-85E1-4A55-9338-2F60FBD16A33}" type="datetimeFigureOut">
+            <a:fld id="{5F74F500-DD36-45EE-ACBA-980ACFF7ABF2}" type="datetime1">
               <a:rPr lang="en-US" smtClean="0"/>
-              <a:t>4/24/2018</a:t>
+              <a:t>4/25/2018</a:t>
             </a:fld>
             <a:endParaRPr lang="en-US"/>
           </a:p>
@@ -19857,9 +20214,9 @@
           <a:bodyPr/>
           <a:lstStyle/>
           <a:p>
-            <a:fld id="{294EEB5F-85E1-4A55-9338-2F60FBD16A33}" type="datetimeFigureOut">
+            <a:fld id="{E47EDA7E-95A5-4825-B527-4FFFCB94CA57}" type="datetime1">
               <a:rPr lang="en-US" smtClean="0"/>
-              <a:t>4/24/2018</a:t>
+              <a:t>4/25/2018</a:t>
             </a:fld>
             <a:endParaRPr lang="en-US"/>
           </a:p>
@@ -20107,9 +20464,9 @@
             </a:lvl1pPr>
           </a:lstStyle>
           <a:p>
-            <a:fld id="{294EEB5F-85E1-4A55-9338-2F60FBD16A33}" type="datetimeFigureOut">
+            <a:fld id="{E1FF0728-0731-454A-9E85-622B530F8DD9}" type="datetime1">
               <a:rPr lang="en-US" smtClean="0"/>
-              <a:t>4/24/2018</a:t>
+              <a:t>4/25/2018</a:t>
             </a:fld>
             <a:endParaRPr lang="en-US"/>
           </a:p>
@@ -20253,6 +20610,7 @@
     <p:sldLayoutId id="2147483670" r:id="rId10"/>
     <p:sldLayoutId id="2147483671" r:id="rId11"/>
   </p:sldLayoutIdLst>
+  <p:hf hdr="0" ftr="0" dt="0"/>
   <p:txStyles>
     <p:titleStyle>
       <a:lvl1pPr algn="l" defTabSz="914400" rtl="0" eaLnBrk="1" latinLnBrk="0" hangingPunct="1">
@@ -20678,6 +21036,35 @@
           </a:p>
         </p:txBody>
       </p:sp>
+      <p:sp>
+        <p:nvSpPr>
+          <p:cNvPr id="4" name="Slide Number Placeholder 3">
+            <a:extLst>
+              <a:ext uri="{FF2B5EF4-FFF2-40B4-BE49-F238E27FC236}">
+                <a16:creationId xmlns:a16="http://schemas.microsoft.com/office/drawing/2014/main" id="{0EA0DA75-25A5-4280-BD96-BC861998358C}"/>
+              </a:ext>
+            </a:extLst>
+          </p:cNvPr>
+          <p:cNvSpPr>
+            <a:spLocks noGrp="1"/>
+          </p:cNvSpPr>
+          <p:nvPr>
+            <p:ph type="sldNum" sz="quarter" idx="12"/>
+          </p:nvPr>
+        </p:nvSpPr>
+        <p:spPr/>
+        <p:txBody>
+          <a:bodyPr/>
+          <a:lstStyle/>
+          <a:p>
+            <a:fld id="{0DD60143-CE5F-467E-9850-5ECB6DE6A8D6}" type="slidenum">
+              <a:rPr lang="en-US" smtClean="0"/>
+              <a:t>1</a:t>
+            </a:fld>
+            <a:endParaRPr lang="en-US"/>
+          </a:p>
+        </p:txBody>
+      </p:sp>
     </p:spTree>
     <p:extLst>
       <p:ext uri="{BB962C8B-B14F-4D97-AF65-F5344CB8AC3E}">
@@ -20766,6 +21153,35 @@
           </a:prstGeom>
         </p:spPr>
       </p:pic>
+      <p:sp>
+        <p:nvSpPr>
+          <p:cNvPr id="3" name="Slide Number Placeholder 2">
+            <a:extLst>
+              <a:ext uri="{FF2B5EF4-FFF2-40B4-BE49-F238E27FC236}">
+                <a16:creationId xmlns:a16="http://schemas.microsoft.com/office/drawing/2014/main" id="{5D604148-D739-4706-A65F-10745B492E20}"/>
+              </a:ext>
+            </a:extLst>
+          </p:cNvPr>
+          <p:cNvSpPr>
+            <a:spLocks noGrp="1"/>
+          </p:cNvSpPr>
+          <p:nvPr>
+            <p:ph type="sldNum" sz="quarter" idx="12"/>
+          </p:nvPr>
+        </p:nvSpPr>
+        <p:spPr/>
+        <p:txBody>
+          <a:bodyPr/>
+          <a:lstStyle/>
+          <a:p>
+            <a:fld id="{0DD60143-CE5F-467E-9850-5ECB6DE6A8D6}" type="slidenum">
+              <a:rPr lang="en-US" smtClean="0"/>
+              <a:t>10</a:t>
+            </a:fld>
+            <a:endParaRPr lang="en-US"/>
+          </a:p>
+        </p:txBody>
+      </p:sp>
     </p:spTree>
     <p:extLst>
       <p:ext uri="{BB962C8B-B14F-4D97-AF65-F5344CB8AC3E}">
@@ -20859,6 +21275,35 @@
           </a:prstGeom>
         </p:spPr>
       </p:pic>
+      <p:sp>
+        <p:nvSpPr>
+          <p:cNvPr id="3" name="Slide Number Placeholder 2">
+            <a:extLst>
+              <a:ext uri="{FF2B5EF4-FFF2-40B4-BE49-F238E27FC236}">
+                <a16:creationId xmlns:a16="http://schemas.microsoft.com/office/drawing/2014/main" id="{59FF5465-82A8-4341-A396-C46EF7AEE6BA}"/>
+              </a:ext>
+            </a:extLst>
+          </p:cNvPr>
+          <p:cNvSpPr>
+            <a:spLocks noGrp="1"/>
+          </p:cNvSpPr>
+          <p:nvPr>
+            <p:ph type="sldNum" sz="quarter" idx="12"/>
+          </p:nvPr>
+        </p:nvSpPr>
+        <p:spPr/>
+        <p:txBody>
+          <a:bodyPr/>
+          <a:lstStyle/>
+          <a:p>
+            <a:fld id="{0DD60143-CE5F-467E-9850-5ECB6DE6A8D6}" type="slidenum">
+              <a:rPr lang="en-US" smtClean="0"/>
+              <a:t>11</a:t>
+            </a:fld>
+            <a:endParaRPr lang="en-US"/>
+          </a:p>
+        </p:txBody>
+      </p:sp>
     </p:spTree>
     <p:extLst>
       <p:ext uri="{BB962C8B-B14F-4D97-AF65-F5344CB8AC3E}">
@@ -20952,6 +21397,35 @@
           </a:prstGeom>
         </p:spPr>
       </p:pic>
+      <p:sp>
+        <p:nvSpPr>
+          <p:cNvPr id="3" name="Slide Number Placeholder 2">
+            <a:extLst>
+              <a:ext uri="{FF2B5EF4-FFF2-40B4-BE49-F238E27FC236}">
+                <a16:creationId xmlns:a16="http://schemas.microsoft.com/office/drawing/2014/main" id="{150B6A2E-B4BB-4B19-9323-3D18063776C7}"/>
+              </a:ext>
+            </a:extLst>
+          </p:cNvPr>
+          <p:cNvSpPr>
+            <a:spLocks noGrp="1"/>
+          </p:cNvSpPr>
+          <p:nvPr>
+            <p:ph type="sldNum" sz="quarter" idx="12"/>
+          </p:nvPr>
+        </p:nvSpPr>
+        <p:spPr/>
+        <p:txBody>
+          <a:bodyPr/>
+          <a:lstStyle/>
+          <a:p>
+            <a:fld id="{0DD60143-CE5F-467E-9850-5ECB6DE6A8D6}" type="slidenum">
+              <a:rPr lang="en-US" smtClean="0"/>
+              <a:t>12</a:t>
+            </a:fld>
+            <a:endParaRPr lang="en-US"/>
+          </a:p>
+        </p:txBody>
+      </p:sp>
     </p:spTree>
     <p:extLst>
       <p:ext uri="{BB962C8B-B14F-4D97-AF65-F5344CB8AC3E}">
@@ -21061,6 +21535,35 @@
               <a:rPr lang="en-US" dirty="0"/>
               <a:t>The over all absolute error of the tracker is less than 0.1</a:t>
             </a:r>
+          </a:p>
+        </p:txBody>
+      </p:sp>
+      <p:sp>
+        <p:nvSpPr>
+          <p:cNvPr id="4" name="Slide Number Placeholder 3">
+            <a:extLst>
+              <a:ext uri="{FF2B5EF4-FFF2-40B4-BE49-F238E27FC236}">
+                <a16:creationId xmlns:a16="http://schemas.microsoft.com/office/drawing/2014/main" id="{0D81DA02-C4A7-48E7-B0C9-15A83287731C}"/>
+              </a:ext>
+            </a:extLst>
+          </p:cNvPr>
+          <p:cNvSpPr>
+            <a:spLocks noGrp="1"/>
+          </p:cNvSpPr>
+          <p:nvPr>
+            <p:ph type="sldNum" sz="quarter" idx="12"/>
+          </p:nvPr>
+        </p:nvSpPr>
+        <p:spPr/>
+        <p:txBody>
+          <a:bodyPr/>
+          <a:lstStyle/>
+          <a:p>
+            <a:fld id="{0DD60143-CE5F-467E-9850-5ECB6DE6A8D6}" type="slidenum">
+              <a:rPr lang="en-US" smtClean="0"/>
+              <a:t>13</a:t>
+            </a:fld>
+            <a:endParaRPr lang="en-US"/>
           </a:p>
         </p:txBody>
       </p:sp>
@@ -21200,6 +21703,35 @@
           </a:p>
         </p:txBody>
       </p:sp>
+      <p:sp>
+        <p:nvSpPr>
+          <p:cNvPr id="4" name="Slide Number Placeholder 3">
+            <a:extLst>
+              <a:ext uri="{FF2B5EF4-FFF2-40B4-BE49-F238E27FC236}">
+                <a16:creationId xmlns:a16="http://schemas.microsoft.com/office/drawing/2014/main" id="{FD920CCF-0F7F-4E4F-A85B-DB8C54CACBC2}"/>
+              </a:ext>
+            </a:extLst>
+          </p:cNvPr>
+          <p:cNvSpPr>
+            <a:spLocks noGrp="1"/>
+          </p:cNvSpPr>
+          <p:nvPr>
+            <p:ph type="sldNum" sz="quarter" idx="12"/>
+          </p:nvPr>
+        </p:nvSpPr>
+        <p:spPr/>
+        <p:txBody>
+          <a:bodyPr/>
+          <a:lstStyle/>
+          <a:p>
+            <a:fld id="{0DD60143-CE5F-467E-9850-5ECB6DE6A8D6}" type="slidenum">
+              <a:rPr lang="en-US" smtClean="0"/>
+              <a:t>14</a:t>
+            </a:fld>
+            <a:endParaRPr lang="en-US"/>
+          </a:p>
+        </p:txBody>
+      </p:sp>
     </p:spTree>
     <p:extLst>
       <p:ext uri="{BB962C8B-B14F-4D97-AF65-F5344CB8AC3E}">
@@ -21260,6 +21792,35 @@
               <a:rPr lang="en-US" dirty="0"/>
               <a:t>Thank you</a:t>
             </a:r>
+          </a:p>
+        </p:txBody>
+      </p:sp>
+      <p:sp>
+        <p:nvSpPr>
+          <p:cNvPr id="3" name="Slide Number Placeholder 2">
+            <a:extLst>
+              <a:ext uri="{FF2B5EF4-FFF2-40B4-BE49-F238E27FC236}">
+                <a16:creationId xmlns:a16="http://schemas.microsoft.com/office/drawing/2014/main" id="{8A47717F-BE91-4318-8141-550577F37F87}"/>
+              </a:ext>
+            </a:extLst>
+          </p:cNvPr>
+          <p:cNvSpPr>
+            <a:spLocks noGrp="1"/>
+          </p:cNvSpPr>
+          <p:nvPr>
+            <p:ph type="sldNum" sz="quarter" idx="12"/>
+          </p:nvPr>
+        </p:nvSpPr>
+        <p:spPr/>
+        <p:txBody>
+          <a:bodyPr/>
+          <a:lstStyle/>
+          <a:p>
+            <a:fld id="{0DD60143-CE5F-467E-9850-5ECB6DE6A8D6}" type="slidenum">
+              <a:rPr lang="en-US" smtClean="0"/>
+              <a:t>15</a:t>
+            </a:fld>
+            <a:endParaRPr lang="en-US"/>
           </a:p>
         </p:txBody>
       </p:sp>
@@ -21379,6 +21940,35 @@
           </a:p>
         </p:txBody>
       </p:sp>
+      <p:sp>
+        <p:nvSpPr>
+          <p:cNvPr id="4" name="Slide Number Placeholder 3">
+            <a:extLst>
+              <a:ext uri="{FF2B5EF4-FFF2-40B4-BE49-F238E27FC236}">
+                <a16:creationId xmlns:a16="http://schemas.microsoft.com/office/drawing/2014/main" id="{1BFFE386-1053-4BED-B54E-92F45162E7D4}"/>
+              </a:ext>
+            </a:extLst>
+          </p:cNvPr>
+          <p:cNvSpPr>
+            <a:spLocks noGrp="1"/>
+          </p:cNvSpPr>
+          <p:nvPr>
+            <p:ph type="sldNum" sz="quarter" idx="12"/>
+          </p:nvPr>
+        </p:nvSpPr>
+        <p:spPr/>
+        <p:txBody>
+          <a:bodyPr/>
+          <a:lstStyle/>
+          <a:p>
+            <a:fld id="{0DD60143-CE5F-467E-9850-5ECB6DE6A8D6}" type="slidenum">
+              <a:rPr lang="en-US" smtClean="0"/>
+              <a:t>2</a:t>
+            </a:fld>
+            <a:endParaRPr lang="en-US"/>
+          </a:p>
+        </p:txBody>
+      </p:sp>
     </p:spTree>
     <p:extLst>
       <p:ext uri="{BB962C8B-B14F-4D97-AF65-F5344CB8AC3E}">
@@ -21475,6 +22065,35 @@
               <a:rPr lang="en-US" dirty="0"/>
               <a:t>To have some hands on experience on how to use LQ tracker to solve  real life control problems.</a:t>
             </a:r>
+          </a:p>
+        </p:txBody>
+      </p:sp>
+      <p:sp>
+        <p:nvSpPr>
+          <p:cNvPr id="4" name="Slide Number Placeholder 3">
+            <a:extLst>
+              <a:ext uri="{FF2B5EF4-FFF2-40B4-BE49-F238E27FC236}">
+                <a16:creationId xmlns:a16="http://schemas.microsoft.com/office/drawing/2014/main" id="{33E79F50-58D0-4AC8-8CA3-40DCBFD7783A}"/>
+              </a:ext>
+            </a:extLst>
+          </p:cNvPr>
+          <p:cNvSpPr>
+            <a:spLocks noGrp="1"/>
+          </p:cNvSpPr>
+          <p:nvPr>
+            <p:ph type="sldNum" sz="quarter" idx="12"/>
+          </p:nvPr>
+        </p:nvSpPr>
+        <p:spPr/>
+        <p:txBody>
+          <a:bodyPr/>
+          <a:lstStyle/>
+          <a:p>
+            <a:fld id="{0DD60143-CE5F-467E-9850-5ECB6DE6A8D6}" type="slidenum">
+              <a:rPr lang="en-US" smtClean="0"/>
+              <a:t>3</a:t>
+            </a:fld>
+            <a:endParaRPr lang="en-US"/>
           </a:p>
         </p:txBody>
       </p:sp>
@@ -21626,8 +22245,8 @@
           </a:prstGeom>
         </p:spPr>
       </p:pic>
-      <mc:AlternateContent xmlns:mc="http://schemas.openxmlformats.org/markup-compatibility/2006">
-        <mc:Choice xmlns:a14="http://schemas.microsoft.com/office/drawing/2010/main" Requires="a14">
+      <mc:AlternateContent xmlns:mc="http://schemas.openxmlformats.org/markup-compatibility/2006" xmlns:a14="http://schemas.microsoft.com/office/drawing/2010/main">
+        <mc:Choice Requires="a14">
           <p:sp>
             <p:nvSpPr>
               <p:cNvPr id="8" name="TextBox 7">
@@ -21841,7 +22460,7 @@
             </p:txBody>
           </p:sp>
         </mc:Choice>
-        <mc:Fallback>
+        <mc:Fallback xmlns="">
           <p:sp>
             <p:nvSpPr>
               <p:cNvPr id="8" name="TextBox 7">
@@ -21886,6 +22505,35 @@
           </p:sp>
         </mc:Fallback>
       </mc:AlternateContent>
+      <p:sp>
+        <p:nvSpPr>
+          <p:cNvPr id="3" name="Slide Number Placeholder 2">
+            <a:extLst>
+              <a:ext uri="{FF2B5EF4-FFF2-40B4-BE49-F238E27FC236}">
+                <a16:creationId xmlns:a16="http://schemas.microsoft.com/office/drawing/2014/main" id="{98A0306E-D14F-4B06-B32C-8407DAAE66E0}"/>
+              </a:ext>
+            </a:extLst>
+          </p:cNvPr>
+          <p:cNvSpPr>
+            <a:spLocks noGrp="1"/>
+          </p:cNvSpPr>
+          <p:nvPr>
+            <p:ph type="sldNum" sz="quarter" idx="12"/>
+          </p:nvPr>
+        </p:nvSpPr>
+        <p:spPr/>
+        <p:txBody>
+          <a:bodyPr/>
+          <a:lstStyle/>
+          <a:p>
+            <a:fld id="{0DD60143-CE5F-467E-9850-5ECB6DE6A8D6}" type="slidenum">
+              <a:rPr lang="en-US" smtClean="0"/>
+              <a:t>4</a:t>
+            </a:fld>
+            <a:endParaRPr lang="en-US"/>
+          </a:p>
+        </p:txBody>
+      </p:sp>
     </p:spTree>
     <p:extLst>
       <p:ext uri="{BB962C8B-B14F-4D97-AF65-F5344CB8AC3E}">
@@ -21949,8 +22597,8 @@
           </a:p>
         </p:txBody>
       </p:sp>
-      <mc:AlternateContent xmlns:mc="http://schemas.openxmlformats.org/markup-compatibility/2006">
-        <mc:Choice xmlns:a14="http://schemas.microsoft.com/office/drawing/2010/main" Requires="a14">
+      <mc:AlternateContent xmlns:mc="http://schemas.openxmlformats.org/markup-compatibility/2006" xmlns:a14="http://schemas.microsoft.com/office/drawing/2010/main">
+        <mc:Choice Requires="a14">
           <p:sp>
             <p:nvSpPr>
               <p:cNvPr id="3" name="Content Placeholder 2">
@@ -23863,7 +24511,7 @@
             </p:txBody>
           </p:sp>
         </mc:Choice>
-        <mc:Fallback>
+        <mc:Fallback xmlns="">
           <p:sp>
             <p:nvSpPr>
               <p:cNvPr id="3" name="Content Placeholder 2">
@@ -23907,8 +24555,8 @@
           </p:sp>
         </mc:Fallback>
       </mc:AlternateContent>
-      <mc:AlternateContent xmlns:mc="http://schemas.openxmlformats.org/markup-compatibility/2006">
-        <mc:Choice xmlns:a14="http://schemas.microsoft.com/office/drawing/2010/main" Requires="a14">
+      <mc:AlternateContent xmlns:mc="http://schemas.openxmlformats.org/markup-compatibility/2006" xmlns:a14="http://schemas.microsoft.com/office/drawing/2010/main">
+        <mc:Choice Requires="a14">
           <p:sp>
             <p:nvSpPr>
               <p:cNvPr id="4" name="Rectangle 3">
@@ -24022,7 +24670,7 @@
             </p:txBody>
           </p:sp>
         </mc:Choice>
-        <mc:Fallback>
+        <mc:Fallback xmlns="">
           <p:sp>
             <p:nvSpPr>
               <p:cNvPr id="4" name="Rectangle 3">
@@ -24116,8 +24764,8 @@
           </a:p>
         </p:txBody>
       </p:sp>
-      <mc:AlternateContent xmlns:mc="http://schemas.openxmlformats.org/markup-compatibility/2006">
-        <mc:Choice xmlns:a14="http://schemas.microsoft.com/office/drawing/2010/main" Requires="a14">
+      <mc:AlternateContent xmlns:mc="http://schemas.openxmlformats.org/markup-compatibility/2006" xmlns:a14="http://schemas.microsoft.com/office/drawing/2010/main">
+        <mc:Choice Requires="a14">
           <p:sp>
             <p:nvSpPr>
               <p:cNvPr id="6" name="Rectangle 5">
@@ -24216,7 +24864,7 @@
             </p:txBody>
           </p:sp>
         </mc:Choice>
-        <mc:Fallback>
+        <mc:Fallback xmlns="">
           <p:sp>
             <p:nvSpPr>
               <p:cNvPr id="6" name="Rectangle 5">
@@ -24769,6 +25417,35 @@
           </a:p>
         </p:txBody>
       </p:sp>
+      <p:sp>
+        <p:nvSpPr>
+          <p:cNvPr id="9" name="Slide Number Placeholder 8">
+            <a:extLst>
+              <a:ext uri="{FF2B5EF4-FFF2-40B4-BE49-F238E27FC236}">
+                <a16:creationId xmlns:a16="http://schemas.microsoft.com/office/drawing/2014/main" id="{79EF4EAE-CC4F-4252-A3E1-9DEBE561A8F8}"/>
+              </a:ext>
+            </a:extLst>
+          </p:cNvPr>
+          <p:cNvSpPr>
+            <a:spLocks noGrp="1"/>
+          </p:cNvSpPr>
+          <p:nvPr>
+            <p:ph type="sldNum" sz="quarter" idx="12"/>
+          </p:nvPr>
+        </p:nvSpPr>
+        <p:spPr/>
+        <p:txBody>
+          <a:bodyPr/>
+          <a:lstStyle/>
+          <a:p>
+            <a:fld id="{0DD60143-CE5F-467E-9850-5ECB6DE6A8D6}" type="slidenum">
+              <a:rPr lang="en-US" smtClean="0"/>
+              <a:t>5</a:t>
+            </a:fld>
+            <a:endParaRPr lang="en-US"/>
+          </a:p>
+        </p:txBody>
+      </p:sp>
     </p:spTree>
     <p:extLst>
       <p:ext uri="{BB962C8B-B14F-4D97-AF65-F5344CB8AC3E}">
@@ -25311,6 +25988,35 @@
           </a:prstGeom>
         </p:spPr>
       </p:pic>
+      <p:sp>
+        <p:nvSpPr>
+          <p:cNvPr id="8" name="Slide Number Placeholder 7">
+            <a:extLst>
+              <a:ext uri="{FF2B5EF4-FFF2-40B4-BE49-F238E27FC236}">
+                <a16:creationId xmlns:a16="http://schemas.microsoft.com/office/drawing/2014/main" id="{A47082BF-135A-4BC9-9246-E79AAC4D5BE4}"/>
+              </a:ext>
+            </a:extLst>
+          </p:cNvPr>
+          <p:cNvSpPr>
+            <a:spLocks noGrp="1"/>
+          </p:cNvSpPr>
+          <p:nvPr>
+            <p:ph type="sldNum" sz="quarter" idx="12"/>
+          </p:nvPr>
+        </p:nvSpPr>
+        <p:spPr/>
+        <p:txBody>
+          <a:bodyPr/>
+          <a:lstStyle/>
+          <a:p>
+            <a:fld id="{0DD60143-CE5F-467E-9850-5ECB6DE6A8D6}" type="slidenum">
+              <a:rPr lang="en-US" smtClean="0"/>
+              <a:t>6</a:t>
+            </a:fld>
+            <a:endParaRPr lang="en-US"/>
+          </a:p>
+        </p:txBody>
+      </p:sp>
     </p:spTree>
     <p:extLst>
       <p:ext uri="{BB962C8B-B14F-4D97-AF65-F5344CB8AC3E}">
@@ -25399,6 +26105,35 @@
           </a:prstGeom>
         </p:spPr>
       </p:pic>
+      <p:sp>
+        <p:nvSpPr>
+          <p:cNvPr id="3" name="Slide Number Placeholder 2">
+            <a:extLst>
+              <a:ext uri="{FF2B5EF4-FFF2-40B4-BE49-F238E27FC236}">
+                <a16:creationId xmlns:a16="http://schemas.microsoft.com/office/drawing/2014/main" id="{64A464D3-ACBE-49F9-8D2D-540670B5AA29}"/>
+              </a:ext>
+            </a:extLst>
+          </p:cNvPr>
+          <p:cNvSpPr>
+            <a:spLocks noGrp="1"/>
+          </p:cNvSpPr>
+          <p:nvPr>
+            <p:ph type="sldNum" sz="quarter" idx="12"/>
+          </p:nvPr>
+        </p:nvSpPr>
+        <p:spPr/>
+        <p:txBody>
+          <a:bodyPr/>
+          <a:lstStyle/>
+          <a:p>
+            <a:fld id="{0DD60143-CE5F-467E-9850-5ECB6DE6A8D6}" type="slidenum">
+              <a:rPr lang="en-US" smtClean="0"/>
+              <a:t>7</a:t>
+            </a:fld>
+            <a:endParaRPr lang="en-US"/>
+          </a:p>
+        </p:txBody>
+      </p:sp>
     </p:spTree>
     <p:extLst>
       <p:ext uri="{BB962C8B-B14F-4D97-AF65-F5344CB8AC3E}">
@@ -25492,6 +26227,35 @@
           </a:prstGeom>
         </p:spPr>
       </p:pic>
+      <p:sp>
+        <p:nvSpPr>
+          <p:cNvPr id="3" name="Slide Number Placeholder 2">
+            <a:extLst>
+              <a:ext uri="{FF2B5EF4-FFF2-40B4-BE49-F238E27FC236}">
+                <a16:creationId xmlns:a16="http://schemas.microsoft.com/office/drawing/2014/main" id="{5EE27E7A-7798-442E-AEC9-4D510F9D9702}"/>
+              </a:ext>
+            </a:extLst>
+          </p:cNvPr>
+          <p:cNvSpPr>
+            <a:spLocks noGrp="1"/>
+          </p:cNvSpPr>
+          <p:nvPr>
+            <p:ph type="sldNum" sz="quarter" idx="12"/>
+          </p:nvPr>
+        </p:nvSpPr>
+        <p:spPr/>
+        <p:txBody>
+          <a:bodyPr/>
+          <a:lstStyle/>
+          <a:p>
+            <a:fld id="{0DD60143-CE5F-467E-9850-5ECB6DE6A8D6}" type="slidenum">
+              <a:rPr lang="en-US" smtClean="0"/>
+              <a:t>8</a:t>
+            </a:fld>
+            <a:endParaRPr lang="en-US"/>
+          </a:p>
+        </p:txBody>
+      </p:sp>
     </p:spTree>
     <p:extLst>
       <p:ext uri="{BB962C8B-B14F-4D97-AF65-F5344CB8AC3E}">
@@ -25585,6 +26349,35 @@
           </a:prstGeom>
         </p:spPr>
       </p:pic>
+      <p:sp>
+        <p:nvSpPr>
+          <p:cNvPr id="3" name="Slide Number Placeholder 2">
+            <a:extLst>
+              <a:ext uri="{FF2B5EF4-FFF2-40B4-BE49-F238E27FC236}">
+                <a16:creationId xmlns:a16="http://schemas.microsoft.com/office/drawing/2014/main" id="{895981B2-970E-4B00-8347-576001D31B19}"/>
+              </a:ext>
+            </a:extLst>
+          </p:cNvPr>
+          <p:cNvSpPr>
+            <a:spLocks noGrp="1"/>
+          </p:cNvSpPr>
+          <p:nvPr>
+            <p:ph type="sldNum" sz="quarter" idx="12"/>
+          </p:nvPr>
+        </p:nvSpPr>
+        <p:spPr/>
+        <p:txBody>
+          <a:bodyPr/>
+          <a:lstStyle/>
+          <a:p>
+            <a:fld id="{0DD60143-CE5F-467E-9850-5ECB6DE6A8D6}" type="slidenum">
+              <a:rPr lang="en-US" smtClean="0"/>
+              <a:t>9</a:t>
+            </a:fld>
+            <a:endParaRPr lang="en-US"/>
+          </a:p>
+        </p:txBody>
+      </p:sp>
     </p:spTree>
     <p:extLst>
       <p:ext uri="{BB962C8B-B14F-4D97-AF65-F5344CB8AC3E}">
@@ -25864,4 +26657,299 @@
     </a:ext>
   </a:extLst>
 </a:theme>
+</file>
+
+<file path=ppt/theme/theme2.xml><?xml version="1.0" encoding="utf-8"?>
+<a:theme xmlns:a="http://schemas.openxmlformats.org/drawingml/2006/main" name="Office Theme">
+  <a:themeElements>
+    <a:clrScheme name="Office">
+      <a:dk1>
+        <a:sysClr val="windowText" lastClr="000000"/>
+      </a:dk1>
+      <a:lt1>
+        <a:sysClr val="window" lastClr="FFFFFF"/>
+      </a:lt1>
+      <a:dk2>
+        <a:srgbClr val="44546A"/>
+      </a:dk2>
+      <a:lt2>
+        <a:srgbClr val="E7E6E6"/>
+      </a:lt2>
+      <a:accent1>
+        <a:srgbClr val="4472C4"/>
+      </a:accent1>
+      <a:accent2>
+        <a:srgbClr val="ED7D31"/>
+      </a:accent2>
+      <a:accent3>
+        <a:srgbClr val="A5A5A5"/>
+      </a:accent3>
+      <a:accent4>
+        <a:srgbClr val="FFC000"/>
+      </a:accent4>
+      <a:accent5>
+        <a:srgbClr val="5B9BD5"/>
+      </a:accent5>
+      <a:accent6>
+        <a:srgbClr val="70AD47"/>
+      </a:accent6>
+      <a:hlink>
+        <a:srgbClr val="0563C1"/>
+      </a:hlink>
+      <a:folHlink>
+        <a:srgbClr val="954F72"/>
+      </a:folHlink>
+    </a:clrScheme>
+    <a:fontScheme name="Office">
+      <a:majorFont>
+        <a:latin typeface="Calibri Light" panose="020F0302020204030204"/>
+        <a:ea typeface=""/>
+        <a:cs typeface=""/>
+        <a:font script="Jpan" typeface="游ゴシック Light"/>
+        <a:font script="Hang" typeface="맑은 고딕"/>
+        <a:font script="Hans" typeface="等线 Light"/>
+        <a:font script="Hant" typeface="新細明體"/>
+        <a:font script="Arab" typeface="Times New Roman"/>
+        <a:font script="Hebr" typeface="Times New Roman"/>
+        <a:font script="Thai" typeface="Angsana New"/>
+        <a:font script="Ethi" typeface="Nyala"/>
+        <a:font script="Beng" typeface="Vrinda"/>
+        <a:font script="Gujr" typeface="Shruti"/>
+        <a:font script="Khmr" typeface="MoolBoran"/>
+        <a:font script="Knda" typeface="Tunga"/>
+        <a:font script="Guru" typeface="Raavi"/>
+        <a:font script="Cans" typeface="Euphemia"/>
+        <a:font script="Cher" typeface="Plantagenet Cherokee"/>
+        <a:font script="Yiii" typeface="Microsoft Yi Baiti"/>
+        <a:font script="Tibt" typeface="Microsoft Himalaya"/>
+        <a:font script="Thaa" typeface="MV Boli"/>
+        <a:font script="Deva" typeface="Mangal"/>
+        <a:font script="Telu" typeface="Gautami"/>
+        <a:font script="Taml" typeface="Latha"/>
+        <a:font script="Syrc" typeface="Estrangelo Edessa"/>
+        <a:font script="Orya" typeface="Kalinga"/>
+        <a:font script="Mlym" typeface="Kartika"/>
+        <a:font script="Laoo" typeface="DokChampa"/>
+        <a:font script="Sinh" typeface="Iskoola Pota"/>
+        <a:font script="Mong" typeface="Mongolian Baiti"/>
+        <a:font script="Viet" typeface="Times New Roman"/>
+        <a:font script="Uigh" typeface="Microsoft Uighur"/>
+        <a:font script="Geor" typeface="Sylfaen"/>
+        <a:font script="Armn" typeface="Arial"/>
+        <a:font script="Bugi" typeface="Leelawadee UI"/>
+        <a:font script="Bopo" typeface="Microsoft JhengHei"/>
+        <a:font script="Java" typeface="Javanese Text"/>
+        <a:font script="Lisu" typeface="Segoe UI"/>
+        <a:font script="Mymr" typeface="Myanmar Text"/>
+        <a:font script="Nkoo" typeface="Ebrima"/>
+        <a:font script="Olck" typeface="Nirmala UI"/>
+        <a:font script="Osma" typeface="Ebrima"/>
+        <a:font script="Phag" typeface="Phagspa"/>
+        <a:font script="Syrn" typeface="Estrangelo Edessa"/>
+        <a:font script="Syrj" typeface="Estrangelo Edessa"/>
+        <a:font script="Syre" typeface="Estrangelo Edessa"/>
+        <a:font script="Sora" typeface="Nirmala UI"/>
+        <a:font script="Tale" typeface="Microsoft Tai Le"/>
+        <a:font script="Talu" typeface="Microsoft New Tai Lue"/>
+        <a:font script="Tfng" typeface="Ebrima"/>
+      </a:majorFont>
+      <a:minorFont>
+        <a:latin typeface="Calibri" panose="020F0502020204030204"/>
+        <a:ea typeface=""/>
+        <a:cs typeface=""/>
+        <a:font script="Jpan" typeface="游ゴシック"/>
+        <a:font script="Hang" typeface="맑은 고딕"/>
+        <a:font script="Hans" typeface="等线"/>
+        <a:font script="Hant" typeface="新細明體"/>
+        <a:font script="Arab" typeface="Arial"/>
+        <a:font script="Hebr" typeface="Arial"/>
+        <a:font script="Thai" typeface="Cordia New"/>
+        <a:font script="Ethi" typeface="Nyala"/>
+        <a:font script="Beng" typeface="Vrinda"/>
+        <a:font script="Gujr" typeface="Shruti"/>
+        <a:font script="Khmr" typeface="DaunPenh"/>
+        <a:font script="Knda" typeface="Tunga"/>
+        <a:font script="Guru" typeface="Raavi"/>
+        <a:font script="Cans" typeface="Euphemia"/>
+        <a:font script="Cher" typeface="Plantagenet Cherokee"/>
+        <a:font script="Yiii" typeface="Microsoft Yi Baiti"/>
+        <a:font script="Tibt" typeface="Microsoft Himalaya"/>
+        <a:font script="Thaa" typeface="MV Boli"/>
+        <a:font script="Deva" typeface="Mangal"/>
+        <a:font script="Telu" typeface="Gautami"/>
+        <a:font script="Taml" typeface="Latha"/>
+        <a:font script="Syrc" typeface="Estrangelo Edessa"/>
+        <a:font script="Orya" typeface="Kalinga"/>
+        <a:font script="Mlym" typeface="Kartika"/>
+        <a:font script="Laoo" typeface="DokChampa"/>
+        <a:font script="Sinh" typeface="Iskoola Pota"/>
+        <a:font script="Mong" typeface="Mongolian Baiti"/>
+        <a:font script="Viet" typeface="Arial"/>
+        <a:font script="Uigh" typeface="Microsoft Uighur"/>
+        <a:font script="Geor" typeface="Sylfaen"/>
+        <a:font script="Armn" typeface="Arial"/>
+        <a:font script="Bugi" typeface="Leelawadee UI"/>
+        <a:font script="Bopo" typeface="Microsoft JhengHei"/>
+        <a:font script="Java" typeface="Javanese Text"/>
+        <a:font script="Lisu" typeface="Segoe UI"/>
+        <a:font script="Mymr" typeface="Myanmar Text"/>
+        <a:font script="Nkoo" typeface="Ebrima"/>
+        <a:font script="Olck" typeface="Nirmala UI"/>
+        <a:font script="Osma" typeface="Ebrima"/>
+        <a:font script="Phag" typeface="Phagspa"/>
+        <a:font script="Syrn" typeface="Estrangelo Edessa"/>
+        <a:font script="Syrj" typeface="Estrangelo Edessa"/>
+        <a:font script="Syre" typeface="Estrangelo Edessa"/>
+        <a:font script="Sora" typeface="Nirmala UI"/>
+        <a:font script="Tale" typeface="Microsoft Tai Le"/>
+        <a:font script="Talu" typeface="Microsoft New Tai Lue"/>
+        <a:font script="Tfng" typeface="Ebrima"/>
+      </a:minorFont>
+    </a:fontScheme>
+    <a:fmtScheme name="Office">
+      <a:fillStyleLst>
+        <a:solidFill>
+          <a:schemeClr val="phClr"/>
+        </a:solidFill>
+        <a:gradFill rotWithShape="1">
+          <a:gsLst>
+            <a:gs pos="0">
+              <a:schemeClr val="phClr">
+                <a:lumMod val="110000"/>
+                <a:satMod val="105000"/>
+                <a:tint val="67000"/>
+              </a:schemeClr>
+            </a:gs>
+            <a:gs pos="50000">
+              <a:schemeClr val="phClr">
+                <a:lumMod val="105000"/>
+                <a:satMod val="103000"/>
+                <a:tint val="73000"/>
+              </a:schemeClr>
+            </a:gs>
+            <a:gs pos="100000">
+              <a:schemeClr val="phClr">
+                <a:lumMod val="105000"/>
+                <a:satMod val="109000"/>
+                <a:tint val="81000"/>
+              </a:schemeClr>
+            </a:gs>
+          </a:gsLst>
+          <a:lin ang="5400000" scaled="0"/>
+        </a:gradFill>
+        <a:gradFill rotWithShape="1">
+          <a:gsLst>
+            <a:gs pos="0">
+              <a:schemeClr val="phClr">
+                <a:satMod val="103000"/>
+                <a:lumMod val="102000"/>
+                <a:tint val="94000"/>
+              </a:schemeClr>
+            </a:gs>
+            <a:gs pos="50000">
+              <a:schemeClr val="phClr">
+                <a:satMod val="110000"/>
+                <a:lumMod val="100000"/>
+                <a:shade val="100000"/>
+              </a:schemeClr>
+            </a:gs>
+            <a:gs pos="100000">
+              <a:schemeClr val="phClr">
+                <a:lumMod val="99000"/>
+                <a:satMod val="120000"/>
+                <a:shade val="78000"/>
+              </a:schemeClr>
+            </a:gs>
+          </a:gsLst>
+          <a:lin ang="5400000" scaled="0"/>
+        </a:gradFill>
+      </a:fillStyleLst>
+      <a:lnStyleLst>
+        <a:ln w="6350" cap="flat" cmpd="sng" algn="ctr">
+          <a:solidFill>
+            <a:schemeClr val="phClr"/>
+          </a:solidFill>
+          <a:prstDash val="solid"/>
+          <a:miter lim="800000"/>
+        </a:ln>
+        <a:ln w="12700" cap="flat" cmpd="sng" algn="ctr">
+          <a:solidFill>
+            <a:schemeClr val="phClr"/>
+          </a:solidFill>
+          <a:prstDash val="solid"/>
+          <a:miter lim="800000"/>
+        </a:ln>
+        <a:ln w="19050" cap="flat" cmpd="sng" algn="ctr">
+          <a:solidFill>
+            <a:schemeClr val="phClr"/>
+          </a:solidFill>
+          <a:prstDash val="solid"/>
+          <a:miter lim="800000"/>
+        </a:ln>
+      </a:lnStyleLst>
+      <a:effectStyleLst>
+        <a:effectStyle>
+          <a:effectLst/>
+        </a:effectStyle>
+        <a:effectStyle>
+          <a:effectLst/>
+        </a:effectStyle>
+        <a:effectStyle>
+          <a:effectLst>
+            <a:outerShdw blurRad="57150" dist="19050" dir="5400000" algn="ctr" rotWithShape="0">
+              <a:srgbClr val="000000">
+                <a:alpha val="63000"/>
+              </a:srgbClr>
+            </a:outerShdw>
+          </a:effectLst>
+        </a:effectStyle>
+      </a:effectStyleLst>
+      <a:bgFillStyleLst>
+        <a:solidFill>
+          <a:schemeClr val="phClr"/>
+        </a:solidFill>
+        <a:solidFill>
+          <a:schemeClr val="phClr">
+            <a:tint val="95000"/>
+            <a:satMod val="170000"/>
+          </a:schemeClr>
+        </a:solidFill>
+        <a:gradFill rotWithShape="1">
+          <a:gsLst>
+            <a:gs pos="0">
+              <a:schemeClr val="phClr">
+                <a:tint val="93000"/>
+                <a:satMod val="150000"/>
+                <a:shade val="98000"/>
+                <a:lumMod val="102000"/>
+              </a:schemeClr>
+            </a:gs>
+            <a:gs pos="50000">
+              <a:schemeClr val="phClr">
+                <a:tint val="98000"/>
+                <a:satMod val="130000"/>
+                <a:shade val="90000"/>
+                <a:lumMod val="103000"/>
+              </a:schemeClr>
+            </a:gs>
+            <a:gs pos="100000">
+              <a:schemeClr val="phClr">
+                <a:shade val="63000"/>
+                <a:satMod val="120000"/>
+              </a:schemeClr>
+            </a:gs>
+          </a:gsLst>
+          <a:lin ang="5400000" scaled="0"/>
+        </a:gradFill>
+      </a:bgFillStyleLst>
+    </a:fmtScheme>
+  </a:themeElements>
+  <a:objectDefaults/>
+  <a:extraClrSchemeLst/>
+  <a:extLst>
+    <a:ext uri="{05A4C25C-085E-4340-85A3-A5531E510DB2}">
+      <thm15:themeFamily xmlns:thm15="http://schemas.microsoft.com/office/thememl/2012/main" name="Office Theme" id="{62F939B6-93AF-4DB8-9C6B-D6C7DFDC589F}" vid="{4A3C46E8-61CC-4603-A589-7422A47A8E4A}"/>
+    </a:ext>
+  </a:extLst>
+</a:theme>
 </file>
</xml_diff>